<commit_message>
added colors to PowerPoint wireframe model
</commit_message>
<xml_diff>
--- a/quiz-app-wireframe.pptx
+++ b/quiz-app-wireframe.pptx
@@ -3969,7 +3969,27 @@
                 <a:effectLst/>
                 <a:latin typeface="inherit"/>
               </a:rPr>
-              <a:t>Users should be asked questions 1 after the other.</a:t>
+              <a:t>Users </a:t>
+            </a:r>
+            <a:r>
+              <a:rPr lang="en-US" b="0" i="0" dirty="0">
+                <a:solidFill>
+                  <a:srgbClr val="373A36"/>
+                </a:solidFill>
+                <a:effectLst/>
+                <a:latin typeface="Consolas" panose="020B0609020204030204" pitchFamily="49" charset="0"/>
+              </a:rPr>
+              <a:t>should</a:t>
+            </a:r>
+            <a:r>
+              <a:rPr lang="en-US" b="0" i="0" dirty="0">
+                <a:solidFill>
+                  <a:srgbClr val="373A36"/>
+                </a:solidFill>
+                <a:effectLst/>
+                <a:latin typeface="inherit"/>
+              </a:rPr>
+              <a:t> be asked questions 1 after the other.</a:t>
             </a:r>
           </a:p>
           <a:p>

</xml_diff>